<commit_message>
slides state machine learning
</commit_message>
<xml_diff>
--- a/intro_cs4110.pptx
+++ b/intro_cs4110.pptx
@@ -33638,14 +33638,24 @@
           <a:p>
             <a:r>
               <a:rPr lang="en-US" dirty="0" smtClean="0"/>
-              <a:t>Email/Slack me if you need help forming a group:</a:t>
+              <a:t>Email/Slack </a:t>
+            </a:r>
+            <a:r>
+              <a:rPr lang="en-US" dirty="0" smtClean="0"/>
+              <a:t>if </a:t>
+            </a:r>
+            <a:r>
+              <a:rPr lang="en-US" dirty="0" smtClean="0"/>
+              <a:t>you need help forming a group:</a:t>
             </a:r>
           </a:p>
           <a:p>
             <a:pPr lvl="1"/>
             <a:r>
-              <a:rPr lang="en-US" u="sng" dirty="0" err="1" smtClean="0"/>
-              <a:t>s.e.verwer@tudelft.nl</a:t>
+              <a:rPr lang="en-US" dirty="0">
+                <a:hlinkClick r:id="rId5"/>
+              </a:rPr>
+              <a:t>a.e.zaidman@tudelft.nl</a:t>
             </a:r>
             <a:endParaRPr lang="en-US" dirty="0" smtClean="0"/>
           </a:p>

</xml_diff>